<commit_message>
docs: presentation on 10/16
</commit_message>
<xml_diff>
--- a/10.16/BA_proposal.pptx
+++ b/10.16/BA_proposal.pptx
@@ -6872,8 +6872,20 @@
           <a:p>
             <a:pPr lvl="1"/>
             <a:r>
+              <a:rPr lang="de-DE" dirty="0" err="1"/>
+              <a:t>basic</a:t>
+            </a:r>
+            <a:r>
               <a:rPr lang="de-DE" dirty="0"/>
-              <a:t>1 basic movement (pick up, shake...) &amp; 2 advanced (basketball, brush teeth...)</a:t>
+              <a:t> movement (pick up, </a:t>
+            </a:r>
+            <a:r>
+              <a:rPr lang="de-DE" dirty="0" err="1"/>
+              <a:t>shake</a:t>
+            </a:r>
+            <a:r>
+              <a:rPr lang="de-DE" dirty="0"/>
+              <a:t>...)</a:t>
             </a:r>
           </a:p>
           <a:p>
@@ -6944,8 +6956,21 @@
             <a:pPr lvl="2"/>
             <a:r>
               <a:rPr lang="de-DE" dirty="0"/>
-              <a:t>Modify original data to strongly affect feature</a:t>
-            </a:r>
+              <a:t>Modify original data to strongly </a:t>
+            </a:r>
+            <a:r>
+              <a:rPr lang="de-DE" dirty="0" err="1"/>
+              <a:t>affect</a:t>
+            </a:r>
+            <a:r>
+              <a:rPr lang="de-DE" dirty="0"/>
+              <a:t> </a:t>
+            </a:r>
+            <a:r>
+              <a:rPr lang="en-US" altLang="zh-CN" dirty="0"/>
+              <a:t>result</a:t>
+            </a:r>
+            <a:endParaRPr lang="de-DE" dirty="0"/>
           </a:p>
           <a:p>
             <a:endParaRPr lang="de-DE" dirty="0"/>

</xml_diff>